<commit_message>
updates to sims geometries. Separated diving board and lmfe into their own geometries for ease in simulating rotations of the rotary motor. Created mother files for centering scan runs. Reorganized some directories. Added documentation about the rotation of the rotary motor in the sims drawings/sims_rotaryRotation.pptx
</commit_message>
<xml_diff>
--- a/drawings/coordinates_forSim.pptx
+++ b/drawings/coordinates_forSim.pptx
@@ -5,7 +5,7 @@
     <p:sldMasterId id="2147483672" r:id="rId1"/>
   </p:sldMasterIdLst>
   <p:notesMasterIdLst>
-    <p:notesMasterId r:id="rId9"/>
+    <p:notesMasterId r:id="rId10"/>
   </p:notesMasterIdLst>
   <p:sldIdLst>
     <p:sldId id="257" r:id="rId2"/>
@@ -15,6 +15,7 @@
     <p:sldId id="263" r:id="rId6"/>
     <p:sldId id="265" r:id="rId7"/>
     <p:sldId id="266" r:id="rId8"/>
+    <p:sldId id="267" r:id="rId9"/>
   </p:sldIdLst>
   <p:sldSz cx="12192000" cy="14630400"/>
   <p:notesSz cx="6858000" cy="9144000"/>
@@ -203,7 +204,7 @@
           <a:p>
             <a:fld id="{A9B54E44-7744-D649-A13C-3FE4F412E222}" type="datetimeFigureOut">
               <a:rPr lang="en-US" smtClean="0"/>
-              <a:t>7/20/20</a:t>
+              <a:t>2/23/21</a:t>
             </a:fld>
             <a:endParaRPr lang="en-US"/>
           </a:p>
@@ -685,7 +686,7 @@
           <a:p>
             <a:fld id="{A258C239-283F-F048-A3A3-B0A692C65F26}" type="datetimeFigureOut">
               <a:rPr lang="en-US" smtClean="0"/>
-              <a:t>7/20/20</a:t>
+              <a:t>2/23/21</a:t>
             </a:fld>
             <a:endParaRPr lang="en-US"/>
           </a:p>
@@ -855,7 +856,7 @@
           <a:p>
             <a:fld id="{A258C239-283F-F048-A3A3-B0A692C65F26}" type="datetimeFigureOut">
               <a:rPr lang="en-US" smtClean="0"/>
-              <a:t>7/20/20</a:t>
+              <a:t>2/23/21</a:t>
             </a:fld>
             <a:endParaRPr lang="en-US"/>
           </a:p>
@@ -1035,7 +1036,7 @@
           <a:p>
             <a:fld id="{A258C239-283F-F048-A3A3-B0A692C65F26}" type="datetimeFigureOut">
               <a:rPr lang="en-US" smtClean="0"/>
-              <a:t>7/20/20</a:t>
+              <a:t>2/23/21</a:t>
             </a:fld>
             <a:endParaRPr lang="en-US"/>
           </a:p>
@@ -1205,7 +1206,7 @@
           <a:p>
             <a:fld id="{A258C239-283F-F048-A3A3-B0A692C65F26}" type="datetimeFigureOut">
               <a:rPr lang="en-US" smtClean="0"/>
-              <a:t>7/20/20</a:t>
+              <a:t>2/23/21</a:t>
             </a:fld>
             <a:endParaRPr lang="en-US"/>
           </a:p>
@@ -1449,7 +1450,7 @@
           <a:p>
             <a:fld id="{A258C239-283F-F048-A3A3-B0A692C65F26}" type="datetimeFigureOut">
               <a:rPr lang="en-US" smtClean="0"/>
-              <a:t>7/20/20</a:t>
+              <a:t>2/23/21</a:t>
             </a:fld>
             <a:endParaRPr lang="en-US"/>
           </a:p>
@@ -1681,7 +1682,7 @@
           <a:p>
             <a:fld id="{A258C239-283F-F048-A3A3-B0A692C65F26}" type="datetimeFigureOut">
               <a:rPr lang="en-US" smtClean="0"/>
-              <a:t>7/20/20</a:t>
+              <a:t>2/23/21</a:t>
             </a:fld>
             <a:endParaRPr lang="en-US"/>
           </a:p>
@@ -2048,7 +2049,7 @@
           <a:p>
             <a:fld id="{A258C239-283F-F048-A3A3-B0A692C65F26}" type="datetimeFigureOut">
               <a:rPr lang="en-US" smtClean="0"/>
-              <a:t>7/20/20</a:t>
+              <a:t>2/23/21</a:t>
             </a:fld>
             <a:endParaRPr lang="en-US"/>
           </a:p>
@@ -2166,7 +2167,7 @@
           <a:p>
             <a:fld id="{A258C239-283F-F048-A3A3-B0A692C65F26}" type="datetimeFigureOut">
               <a:rPr lang="en-US" smtClean="0"/>
-              <a:t>7/20/20</a:t>
+              <a:t>2/23/21</a:t>
             </a:fld>
             <a:endParaRPr lang="en-US"/>
           </a:p>
@@ -2261,7 +2262,7 @@
           <a:p>
             <a:fld id="{A258C239-283F-F048-A3A3-B0A692C65F26}" type="datetimeFigureOut">
               <a:rPr lang="en-US" smtClean="0"/>
-              <a:t>7/20/20</a:t>
+              <a:t>2/23/21</a:t>
             </a:fld>
             <a:endParaRPr lang="en-US"/>
           </a:p>
@@ -2538,7 +2539,7 @@
           <a:p>
             <a:fld id="{A258C239-283F-F048-A3A3-B0A692C65F26}" type="datetimeFigureOut">
               <a:rPr lang="en-US" smtClean="0"/>
-              <a:t>7/20/20</a:t>
+              <a:t>2/23/21</a:t>
             </a:fld>
             <a:endParaRPr lang="en-US"/>
           </a:p>
@@ -2795,7 +2796,7 @@
           <a:p>
             <a:fld id="{A258C239-283F-F048-A3A3-B0A692C65F26}" type="datetimeFigureOut">
               <a:rPr lang="en-US" smtClean="0"/>
-              <a:t>7/20/20</a:t>
+              <a:t>2/23/21</a:t>
             </a:fld>
             <a:endParaRPr lang="en-US"/>
           </a:p>
@@ -3008,7 +3009,7 @@
           <a:p>
             <a:fld id="{A258C239-283F-F048-A3A3-B0A692C65F26}" type="datetimeFigureOut">
               <a:rPr lang="en-US" smtClean="0"/>
-              <a:t>7/20/20</a:t>
+              <a:t>2/23/21</a:t>
             </a:fld>
             <a:endParaRPr lang="en-US"/>
           </a:p>
@@ -18438,8 +18439,8 @@
           </a:fontRef>
         </p:style>
       </p:cxnSp>
-      <mc:AlternateContent xmlns:mc="http://schemas.openxmlformats.org/markup-compatibility/2006">
-        <mc:Choice xmlns:a14="http://schemas.microsoft.com/office/drawing/2010/main" Requires="a14">
+      <mc:AlternateContent xmlns:mc="http://schemas.openxmlformats.org/markup-compatibility/2006" xmlns:a14="http://schemas.microsoft.com/office/drawing/2010/main">
+        <mc:Choice Requires="a14">
           <p:sp>
             <p:nvSpPr>
               <p:cNvPr id="153" name="TextBox 152">
@@ -18540,7 +18541,7 @@
             </p:txBody>
           </p:sp>
         </mc:Choice>
-        <mc:Fallback>
+        <mc:Fallback xmlns="">
           <p:sp>
             <p:nvSpPr>
               <p:cNvPr id="153" name="TextBox 152">
@@ -24168,6 +24169,1037 @@
     <p:extLst>
       <p:ext uri="{BB962C8B-B14F-4D97-AF65-F5344CB8AC3E}">
         <p14:creationId xmlns:p14="http://schemas.microsoft.com/office/powerpoint/2010/main" val="3959346423"/>
+      </p:ext>
+    </p:extLst>
+  </p:cSld>
+  <p:clrMapOvr>
+    <a:masterClrMapping/>
+  </p:clrMapOvr>
+</p:sld>
+</file>
+
+<file path=ppt/slides/slide8.xml><?xml version="1.0" encoding="utf-8"?>
+<p:sld xmlns:a="http://schemas.openxmlformats.org/drawingml/2006/main" xmlns:r="http://schemas.openxmlformats.org/officeDocument/2006/relationships" xmlns:p="http://schemas.openxmlformats.org/presentationml/2006/main">
+  <p:cSld>
+    <p:spTree>
+      <p:nvGrpSpPr>
+        <p:cNvPr id="1" name=""/>
+        <p:cNvGrpSpPr/>
+        <p:nvPr/>
+      </p:nvGrpSpPr>
+      <p:grpSpPr>
+        <a:xfrm>
+          <a:off x="0" y="0"/>
+          <a:ext cx="0" cy="0"/>
+          <a:chOff x="0" y="0"/>
+          <a:chExt cx="0" cy="0"/>
+        </a:xfrm>
+      </p:grpSpPr>
+      <p:pic>
+        <p:nvPicPr>
+          <p:cNvPr id="21" name="Picture 20">
+            <a:extLst>
+              <a:ext uri="{FF2B5EF4-FFF2-40B4-BE49-F238E27FC236}">
+                <a16:creationId xmlns:a16="http://schemas.microsoft.com/office/drawing/2014/main" id="{84329ED1-975A-9646-9447-1068A93F71BD}"/>
+              </a:ext>
+            </a:extLst>
+          </p:cNvPr>
+          <p:cNvPicPr>
+            <a:picLocks noChangeAspect="1"/>
+          </p:cNvPicPr>
+          <p:nvPr/>
+        </p:nvPicPr>
+        <p:blipFill>
+          <a:blip r:embed="rId2"/>
+          <a:stretch>
+            <a:fillRect/>
+          </a:stretch>
+        </p:blipFill>
+        <p:spPr>
+          <a:xfrm>
+            <a:off x="-57606" y="2199785"/>
+            <a:ext cx="12249606" cy="8849214"/>
+          </a:xfrm>
+          <a:prstGeom prst="rect">
+            <a:avLst/>
+          </a:prstGeom>
+        </p:spPr>
+      </p:pic>
+      <p:grpSp>
+        <p:nvGrpSpPr>
+          <p:cNvPr id="4" name="Group 3">
+            <a:extLst>
+              <a:ext uri="{FF2B5EF4-FFF2-40B4-BE49-F238E27FC236}">
+                <a16:creationId xmlns:a16="http://schemas.microsoft.com/office/drawing/2014/main" id="{9BB3B5FA-2471-A44A-A2E4-BF80E90EB60D}"/>
+              </a:ext>
+            </a:extLst>
+          </p:cNvPr>
+          <p:cNvGrpSpPr/>
+          <p:nvPr/>
+        </p:nvGrpSpPr>
+        <p:grpSpPr>
+          <a:xfrm>
+            <a:off x="5835422" y="3987236"/>
+            <a:ext cx="463550" cy="393700"/>
+            <a:chOff x="6013183" y="3111500"/>
+            <a:chExt cx="463550" cy="393700"/>
+          </a:xfrm>
+          <a:solidFill>
+            <a:srgbClr val="FF0000"/>
+          </a:solidFill>
+        </p:grpSpPr>
+        <p:sp>
+          <p:nvSpPr>
+            <p:cNvPr id="5" name="Oval 4">
+              <a:extLst>
+                <a:ext uri="{FF2B5EF4-FFF2-40B4-BE49-F238E27FC236}">
+                  <a16:creationId xmlns:a16="http://schemas.microsoft.com/office/drawing/2014/main" id="{4DF76CD4-F192-2845-9156-0FF40EE3E70E}"/>
+                </a:ext>
+              </a:extLst>
+            </p:cNvPr>
+            <p:cNvSpPr>
+              <a:spLocks noChangeAspect="1"/>
+            </p:cNvSpPr>
+            <p:nvPr/>
+          </p:nvSpPr>
+          <p:spPr>
+            <a:xfrm>
+              <a:off x="6178283" y="3263290"/>
+              <a:ext cx="91440" cy="91440"/>
+            </a:xfrm>
+            <a:prstGeom prst="ellipse">
+              <a:avLst/>
+            </a:prstGeom>
+            <a:grpFill/>
+            <a:ln w="25400">
+              <a:solidFill>
+                <a:srgbClr val="FF0000"/>
+              </a:solidFill>
+            </a:ln>
+          </p:spPr>
+          <p:style>
+            <a:lnRef idx="2">
+              <a:schemeClr val="accent1">
+                <a:shade val="50000"/>
+              </a:schemeClr>
+            </a:lnRef>
+            <a:fillRef idx="1">
+              <a:schemeClr val="accent1"/>
+            </a:fillRef>
+            <a:effectRef idx="0">
+              <a:schemeClr val="accent1"/>
+            </a:effectRef>
+            <a:fontRef idx="minor">
+              <a:schemeClr val="lt1"/>
+            </a:fontRef>
+          </p:style>
+          <p:txBody>
+            <a:bodyPr rtlCol="0" anchor="ctr"/>
+            <a:lstStyle/>
+            <a:p>
+              <a:pPr algn="ctr"/>
+              <a:endParaRPr lang="en-US"/>
+            </a:p>
+          </p:txBody>
+        </p:sp>
+        <p:cxnSp>
+          <p:nvCxnSpPr>
+            <p:cNvPr id="6" name="Straight Connector 5">
+              <a:extLst>
+                <a:ext uri="{FF2B5EF4-FFF2-40B4-BE49-F238E27FC236}">
+                  <a16:creationId xmlns:a16="http://schemas.microsoft.com/office/drawing/2014/main" id="{210490CA-812E-274A-BBDF-66AC8AE0FF94}"/>
+                </a:ext>
+              </a:extLst>
+            </p:cNvPr>
+            <p:cNvCxnSpPr>
+              <a:cxnSpLocks/>
+            </p:cNvCxnSpPr>
+            <p:nvPr/>
+          </p:nvCxnSpPr>
+          <p:spPr>
+            <a:xfrm>
+              <a:off x="6219201" y="3111500"/>
+              <a:ext cx="0" cy="393700"/>
+            </a:xfrm>
+            <a:prstGeom prst="line">
+              <a:avLst/>
+            </a:prstGeom>
+            <a:grpFill/>
+            <a:ln w="25400">
+              <a:solidFill>
+                <a:srgbClr val="FF0000"/>
+              </a:solidFill>
+            </a:ln>
+          </p:spPr>
+          <p:style>
+            <a:lnRef idx="1">
+              <a:schemeClr val="accent1"/>
+            </a:lnRef>
+            <a:fillRef idx="0">
+              <a:schemeClr val="accent1"/>
+            </a:fillRef>
+            <a:effectRef idx="0">
+              <a:schemeClr val="accent1"/>
+            </a:effectRef>
+            <a:fontRef idx="minor">
+              <a:schemeClr val="tx1"/>
+            </a:fontRef>
+          </p:style>
+        </p:cxnSp>
+        <p:cxnSp>
+          <p:nvCxnSpPr>
+            <p:cNvPr id="7" name="Straight Connector 6">
+              <a:extLst>
+                <a:ext uri="{FF2B5EF4-FFF2-40B4-BE49-F238E27FC236}">
+                  <a16:creationId xmlns:a16="http://schemas.microsoft.com/office/drawing/2014/main" id="{D81E0E85-B975-1248-A3AA-A59F0BB924B0}"/>
+                </a:ext>
+              </a:extLst>
+            </p:cNvPr>
+            <p:cNvCxnSpPr>
+              <a:cxnSpLocks/>
+            </p:cNvCxnSpPr>
+            <p:nvPr/>
+          </p:nvCxnSpPr>
+          <p:spPr>
+            <a:xfrm>
+              <a:off x="6013183" y="3308350"/>
+              <a:ext cx="463550" cy="0"/>
+            </a:xfrm>
+            <a:prstGeom prst="line">
+              <a:avLst/>
+            </a:prstGeom>
+            <a:grpFill/>
+            <a:ln w="25400">
+              <a:solidFill>
+                <a:srgbClr val="FF0000"/>
+              </a:solidFill>
+            </a:ln>
+          </p:spPr>
+          <p:style>
+            <a:lnRef idx="1">
+              <a:schemeClr val="accent1"/>
+            </a:lnRef>
+            <a:fillRef idx="0">
+              <a:schemeClr val="accent1"/>
+            </a:fillRef>
+            <a:effectRef idx="0">
+              <a:schemeClr val="accent1"/>
+            </a:effectRef>
+            <a:fontRef idx="minor">
+              <a:schemeClr val="tx1"/>
+            </a:fontRef>
+          </p:style>
+        </p:cxnSp>
+      </p:grpSp>
+      <p:grpSp>
+        <p:nvGrpSpPr>
+          <p:cNvPr id="8" name="Group 7">
+            <a:extLst>
+              <a:ext uri="{FF2B5EF4-FFF2-40B4-BE49-F238E27FC236}">
+                <a16:creationId xmlns:a16="http://schemas.microsoft.com/office/drawing/2014/main" id="{8CD2B92C-2282-A845-893C-AAC177901176}"/>
+              </a:ext>
+            </a:extLst>
+          </p:cNvPr>
+          <p:cNvGrpSpPr>
+            <a:grpSpLocks noChangeAspect="1"/>
+          </p:cNvGrpSpPr>
+          <p:nvPr/>
+        </p:nvGrpSpPr>
+        <p:grpSpPr>
+          <a:xfrm>
+            <a:off x="7392356" y="3940198"/>
+            <a:ext cx="580835" cy="487776"/>
+            <a:chOff x="6013183" y="3111500"/>
+            <a:chExt cx="463550" cy="393700"/>
+          </a:xfrm>
+          <a:solidFill>
+            <a:srgbClr val="7030A0"/>
+          </a:solidFill>
+        </p:grpSpPr>
+        <p:sp>
+          <p:nvSpPr>
+            <p:cNvPr id="9" name="Oval 8">
+              <a:extLst>
+                <a:ext uri="{FF2B5EF4-FFF2-40B4-BE49-F238E27FC236}">
+                  <a16:creationId xmlns:a16="http://schemas.microsoft.com/office/drawing/2014/main" id="{6595A651-C087-9B4C-ABC5-F61D6C2CD7BE}"/>
+                </a:ext>
+              </a:extLst>
+            </p:cNvPr>
+            <p:cNvSpPr>
+              <a:spLocks noChangeAspect="1"/>
+            </p:cNvSpPr>
+            <p:nvPr/>
+          </p:nvSpPr>
+          <p:spPr>
+            <a:xfrm>
+              <a:off x="6178283" y="3263290"/>
+              <a:ext cx="91440" cy="91440"/>
+            </a:xfrm>
+            <a:prstGeom prst="ellipse">
+              <a:avLst/>
+            </a:prstGeom>
+            <a:solidFill>
+              <a:srgbClr val="7030A0"/>
+            </a:solidFill>
+            <a:ln w="25400">
+              <a:solidFill>
+                <a:srgbClr val="7030A0"/>
+              </a:solidFill>
+            </a:ln>
+          </p:spPr>
+          <p:style>
+            <a:lnRef idx="2">
+              <a:schemeClr val="accent1">
+                <a:shade val="50000"/>
+              </a:schemeClr>
+            </a:lnRef>
+            <a:fillRef idx="1">
+              <a:schemeClr val="accent1"/>
+            </a:fillRef>
+            <a:effectRef idx="0">
+              <a:schemeClr val="accent1"/>
+            </a:effectRef>
+            <a:fontRef idx="minor">
+              <a:schemeClr val="lt1"/>
+            </a:fontRef>
+          </p:style>
+          <p:txBody>
+            <a:bodyPr rtlCol="0" anchor="ctr"/>
+            <a:lstStyle/>
+            <a:p>
+              <a:pPr algn="ctr"/>
+              <a:endParaRPr lang="en-US"/>
+            </a:p>
+          </p:txBody>
+        </p:sp>
+        <p:cxnSp>
+          <p:nvCxnSpPr>
+            <p:cNvPr id="10" name="Straight Connector 9">
+              <a:extLst>
+                <a:ext uri="{FF2B5EF4-FFF2-40B4-BE49-F238E27FC236}">
+                  <a16:creationId xmlns:a16="http://schemas.microsoft.com/office/drawing/2014/main" id="{04B42413-798F-BC4A-8458-F6EDAEC903A8}"/>
+                </a:ext>
+              </a:extLst>
+            </p:cNvPr>
+            <p:cNvCxnSpPr>
+              <a:cxnSpLocks/>
+            </p:cNvCxnSpPr>
+            <p:nvPr/>
+          </p:nvCxnSpPr>
+          <p:spPr>
+            <a:xfrm>
+              <a:off x="6219201" y="3111500"/>
+              <a:ext cx="0" cy="393700"/>
+            </a:xfrm>
+            <a:prstGeom prst="line">
+              <a:avLst/>
+            </a:prstGeom>
+            <a:grpFill/>
+            <a:ln w="25400">
+              <a:solidFill>
+                <a:srgbClr val="7030A0"/>
+              </a:solidFill>
+            </a:ln>
+          </p:spPr>
+          <p:style>
+            <a:lnRef idx="1">
+              <a:schemeClr val="accent1"/>
+            </a:lnRef>
+            <a:fillRef idx="0">
+              <a:schemeClr val="accent1"/>
+            </a:fillRef>
+            <a:effectRef idx="0">
+              <a:schemeClr val="accent1"/>
+            </a:effectRef>
+            <a:fontRef idx="minor">
+              <a:schemeClr val="tx1"/>
+            </a:fontRef>
+          </p:style>
+        </p:cxnSp>
+        <p:cxnSp>
+          <p:nvCxnSpPr>
+            <p:cNvPr id="11" name="Straight Connector 10">
+              <a:extLst>
+                <a:ext uri="{FF2B5EF4-FFF2-40B4-BE49-F238E27FC236}">
+                  <a16:creationId xmlns:a16="http://schemas.microsoft.com/office/drawing/2014/main" id="{AF31B26F-202E-8248-B75C-CA82DAB8AB65}"/>
+                </a:ext>
+              </a:extLst>
+            </p:cNvPr>
+            <p:cNvCxnSpPr>
+              <a:cxnSpLocks/>
+            </p:cNvCxnSpPr>
+            <p:nvPr/>
+          </p:nvCxnSpPr>
+          <p:spPr>
+            <a:xfrm>
+              <a:off x="6013183" y="3308350"/>
+              <a:ext cx="463550" cy="0"/>
+            </a:xfrm>
+            <a:prstGeom prst="line">
+              <a:avLst/>
+            </a:prstGeom>
+            <a:grpFill/>
+            <a:ln w="25400">
+              <a:solidFill>
+                <a:srgbClr val="7030A0"/>
+              </a:solidFill>
+            </a:ln>
+          </p:spPr>
+          <p:style>
+            <a:lnRef idx="1">
+              <a:schemeClr val="accent1"/>
+            </a:lnRef>
+            <a:fillRef idx="0">
+              <a:schemeClr val="accent1"/>
+            </a:fillRef>
+            <a:effectRef idx="0">
+              <a:schemeClr val="accent1"/>
+            </a:effectRef>
+            <a:fontRef idx="minor">
+              <a:schemeClr val="tx1"/>
+            </a:fontRef>
+          </p:style>
+        </p:cxnSp>
+      </p:grpSp>
+      <p:sp>
+        <p:nvSpPr>
+          <p:cNvPr id="12" name="TextBox 11">
+            <a:extLst>
+              <a:ext uri="{FF2B5EF4-FFF2-40B4-BE49-F238E27FC236}">
+                <a16:creationId xmlns:a16="http://schemas.microsoft.com/office/drawing/2014/main" id="{3A701D97-D802-0E43-8A28-D862484F80BE}"/>
+              </a:ext>
+            </a:extLst>
+          </p:cNvPr>
+          <p:cNvSpPr txBox="1"/>
+          <p:nvPr/>
+        </p:nvSpPr>
+        <p:spPr>
+          <a:xfrm>
+            <a:off x="208157" y="11288738"/>
+            <a:ext cx="11983843" cy="3354765"/>
+          </a:xfrm>
+          <a:prstGeom prst="rect">
+            <a:avLst/>
+          </a:prstGeom>
+          <a:noFill/>
+        </p:spPr>
+        <p:txBody>
+          <a:bodyPr wrap="square" rtlCol="0">
+            <a:spAutoFit/>
+          </a:bodyPr>
+          <a:lstStyle/>
+          <a:p>
+            <a:r>
+              <a:rPr lang="en-US" sz="3200" dirty="0"/>
+              <a:t>This is with the view rotated to 17.92 degrees, looking along the LMFE</a:t>
+            </a:r>
+          </a:p>
+          <a:p>
+            <a:r>
+              <a:rPr lang="en-US" sz="3200" dirty="0"/>
+              <a:t>The source is also translated to 10 mm</a:t>
+            </a:r>
+          </a:p>
+          <a:p>
+            <a:endParaRPr lang="en-US" sz="3200" dirty="0"/>
+          </a:p>
+          <a:p>
+            <a:r>
+              <a:rPr lang="en-US" sz="3200" dirty="0"/>
+              <a:t>The rotational position of the LMFE is nominally at </a:t>
+            </a:r>
+            <a:br>
+              <a:rPr lang="en-US" sz="3200" dirty="0"/>
+            </a:br>
+            <a:r>
+              <a:rPr lang="en-US" sz="2800" dirty="0">
+                <a:latin typeface="Courier" pitchFamily="2" charset="0"/>
+              </a:rPr>
+              <a:t>&lt;rotation name="OPPI1_diving_board_volume_Rotation" z=”(</a:t>
+            </a:r>
+            <a:r>
+              <a:rPr lang="en-US" sz="2800" b="1" dirty="0">
+                <a:latin typeface="Courier" pitchFamily="2" charset="0"/>
+              </a:rPr>
+              <a:t>180-17.92)" </a:t>
+            </a:r>
+            <a:r>
+              <a:rPr lang="en-US" sz="2800" dirty="0">
+                <a:latin typeface="Courier" pitchFamily="2" charset="0"/>
+              </a:rPr>
+              <a:t>unit="</a:t>
+            </a:r>
+            <a:r>
+              <a:rPr lang="en-US" sz="2800" dirty="0" err="1">
+                <a:latin typeface="Courier" pitchFamily="2" charset="0"/>
+              </a:rPr>
+              <a:t>deg</a:t>
+            </a:r>
+            <a:r>
+              <a:rPr lang="en-US" sz="2800" dirty="0">
+                <a:latin typeface="Courier" pitchFamily="2" charset="0"/>
+              </a:rPr>
+              <a:t>"/&gt;</a:t>
+            </a:r>
+            <a:br>
+              <a:rPr lang="en-US" sz="3200" dirty="0">
+                <a:latin typeface="Courier" pitchFamily="2" charset="0"/>
+              </a:rPr>
+            </a:br>
+            <a:r>
+              <a:rPr lang="en-US" sz="2800" dirty="0"/>
+              <a:t>(see </a:t>
+            </a:r>
+            <a:r>
+              <a:rPr lang="en-US" sz="2800" dirty="0" err="1"/>
+              <a:t>sims_rotaryRotation.pptx</a:t>
+            </a:r>
+            <a:r>
+              <a:rPr lang="en-US" sz="2800" dirty="0"/>
+              <a:t> for details)</a:t>
+            </a:r>
+            <a:endParaRPr lang="en-US" sz="3200" dirty="0"/>
+          </a:p>
+        </p:txBody>
+      </p:sp>
+      <p:cxnSp>
+        <p:nvCxnSpPr>
+          <p:cNvPr id="13" name="Straight Arrow Connector 12">
+            <a:extLst>
+              <a:ext uri="{FF2B5EF4-FFF2-40B4-BE49-F238E27FC236}">
+                <a16:creationId xmlns:a16="http://schemas.microsoft.com/office/drawing/2014/main" id="{793AE48F-6969-1540-A021-15474475C009}"/>
+              </a:ext>
+            </a:extLst>
+          </p:cNvPr>
+          <p:cNvCxnSpPr>
+            <a:cxnSpLocks/>
+          </p:cNvCxnSpPr>
+          <p:nvPr/>
+        </p:nvCxnSpPr>
+        <p:spPr>
+          <a:xfrm>
+            <a:off x="3781339" y="4241549"/>
+            <a:ext cx="0" cy="4310113"/>
+          </a:xfrm>
+          <a:prstGeom prst="straightConnector1">
+            <a:avLst/>
+          </a:prstGeom>
+          <a:ln w="47625">
+            <a:solidFill>
+              <a:schemeClr val="tx1"/>
+            </a:solidFill>
+            <a:headEnd type="triangle"/>
+            <a:tailEnd type="triangle"/>
+          </a:ln>
+        </p:spPr>
+        <p:style>
+          <a:lnRef idx="1">
+            <a:schemeClr val="accent1"/>
+          </a:lnRef>
+          <a:fillRef idx="0">
+            <a:schemeClr val="accent1"/>
+          </a:fillRef>
+          <a:effectRef idx="0">
+            <a:schemeClr val="accent1"/>
+          </a:effectRef>
+          <a:fontRef idx="minor">
+            <a:schemeClr val="tx1"/>
+          </a:fontRef>
+        </p:style>
+      </p:cxnSp>
+      <p:sp>
+        <p:nvSpPr>
+          <p:cNvPr id="14" name="TextBox 13">
+            <a:extLst>
+              <a:ext uri="{FF2B5EF4-FFF2-40B4-BE49-F238E27FC236}">
+                <a16:creationId xmlns:a16="http://schemas.microsoft.com/office/drawing/2014/main" id="{FEAEF400-62AD-4A4A-A103-65FE86B47784}"/>
+              </a:ext>
+            </a:extLst>
+          </p:cNvPr>
+          <p:cNvSpPr txBox="1"/>
+          <p:nvPr/>
+        </p:nvSpPr>
+        <p:spPr>
+          <a:xfrm>
+            <a:off x="2902733" y="6104217"/>
+            <a:ext cx="1757212" cy="584775"/>
+          </a:xfrm>
+          <a:prstGeom prst="rect">
+            <a:avLst/>
+          </a:prstGeom>
+          <a:solidFill>
+            <a:schemeClr val="bg1"/>
+          </a:solidFill>
+        </p:spPr>
+        <p:txBody>
+          <a:bodyPr wrap="none" rtlCol="0">
+            <a:spAutoFit/>
+          </a:bodyPr>
+          <a:lstStyle/>
+          <a:p>
+            <a:r>
+              <a:rPr lang="en-US" sz="3200" dirty="0"/>
+              <a:t>22.0 mm </a:t>
+            </a:r>
+          </a:p>
+        </p:txBody>
+      </p:sp>
+      <p:cxnSp>
+        <p:nvCxnSpPr>
+          <p:cNvPr id="17" name="Straight Arrow Connector 16">
+            <a:extLst>
+              <a:ext uri="{FF2B5EF4-FFF2-40B4-BE49-F238E27FC236}">
+                <a16:creationId xmlns:a16="http://schemas.microsoft.com/office/drawing/2014/main" id="{DA1E53EA-C125-EC4C-8941-07A0E2B27A4F}"/>
+              </a:ext>
+            </a:extLst>
+          </p:cNvPr>
+          <p:cNvCxnSpPr>
+            <a:cxnSpLocks/>
+          </p:cNvCxnSpPr>
+          <p:nvPr/>
+        </p:nvCxnSpPr>
+        <p:spPr>
+          <a:xfrm>
+            <a:off x="7392356" y="7991224"/>
+            <a:ext cx="0" cy="560438"/>
+          </a:xfrm>
+          <a:prstGeom prst="straightConnector1">
+            <a:avLst/>
+          </a:prstGeom>
+          <a:ln w="47625">
+            <a:solidFill>
+              <a:schemeClr val="tx1"/>
+            </a:solidFill>
+            <a:headEnd type="triangle"/>
+            <a:tailEnd type="triangle"/>
+          </a:ln>
+        </p:spPr>
+        <p:style>
+          <a:lnRef idx="1">
+            <a:schemeClr val="accent1"/>
+          </a:lnRef>
+          <a:fillRef idx="0">
+            <a:schemeClr val="accent1"/>
+          </a:fillRef>
+          <a:effectRef idx="0">
+            <a:schemeClr val="accent1"/>
+          </a:effectRef>
+          <a:fontRef idx="minor">
+            <a:schemeClr val="tx1"/>
+          </a:fontRef>
+        </p:style>
+      </p:cxnSp>
+      <p:sp>
+        <p:nvSpPr>
+          <p:cNvPr id="24" name="TextBox 23">
+            <a:extLst>
+              <a:ext uri="{FF2B5EF4-FFF2-40B4-BE49-F238E27FC236}">
+                <a16:creationId xmlns:a16="http://schemas.microsoft.com/office/drawing/2014/main" id="{C347C636-772B-2B4F-832F-F783F8F97CA3}"/>
+              </a:ext>
+            </a:extLst>
+          </p:cNvPr>
+          <p:cNvSpPr txBox="1"/>
+          <p:nvPr/>
+        </p:nvSpPr>
+        <p:spPr>
+          <a:xfrm>
+            <a:off x="5360617" y="3520871"/>
+            <a:ext cx="1462690" cy="523220"/>
+          </a:xfrm>
+          <a:prstGeom prst="rect">
+            <a:avLst/>
+          </a:prstGeom>
+          <a:noFill/>
+        </p:spPr>
+        <p:txBody>
+          <a:bodyPr wrap="square" rtlCol="0">
+            <a:spAutoFit/>
+          </a:bodyPr>
+          <a:lstStyle/>
+          <a:p>
+            <a:r>
+              <a:rPr lang="en-US" sz="2800" dirty="0"/>
+              <a:t>(0, 0, 0)</a:t>
+            </a:r>
+          </a:p>
+        </p:txBody>
+      </p:sp>
+      <p:cxnSp>
+        <p:nvCxnSpPr>
+          <p:cNvPr id="25" name="Straight Connector 24">
+            <a:extLst>
+              <a:ext uri="{FF2B5EF4-FFF2-40B4-BE49-F238E27FC236}">
+                <a16:creationId xmlns:a16="http://schemas.microsoft.com/office/drawing/2014/main" id="{144A10A3-3E7C-5747-9468-449ED637EDA9}"/>
+              </a:ext>
+            </a:extLst>
+          </p:cNvPr>
+          <p:cNvCxnSpPr>
+            <a:cxnSpLocks/>
+          </p:cNvCxnSpPr>
+          <p:nvPr/>
+        </p:nvCxnSpPr>
+        <p:spPr>
+          <a:xfrm>
+            <a:off x="7106862" y="8010274"/>
+            <a:ext cx="543638" cy="0"/>
+          </a:xfrm>
+          <a:prstGeom prst="line">
+            <a:avLst/>
+          </a:prstGeom>
+          <a:ln w="57150">
+            <a:solidFill>
+              <a:schemeClr val="bg1">
+                <a:lumMod val="50000"/>
+              </a:schemeClr>
+            </a:solidFill>
+            <a:prstDash val="sysDot"/>
+          </a:ln>
+        </p:spPr>
+        <p:style>
+          <a:lnRef idx="1">
+            <a:schemeClr val="accent1"/>
+          </a:lnRef>
+          <a:fillRef idx="0">
+            <a:schemeClr val="accent1"/>
+          </a:fillRef>
+          <a:effectRef idx="0">
+            <a:schemeClr val="accent1"/>
+          </a:effectRef>
+          <a:fontRef idx="minor">
+            <a:schemeClr val="tx1"/>
+          </a:fontRef>
+        </p:style>
+      </p:cxnSp>
+      <p:cxnSp>
+        <p:nvCxnSpPr>
+          <p:cNvPr id="30" name="Straight Connector 29">
+            <a:extLst>
+              <a:ext uri="{FF2B5EF4-FFF2-40B4-BE49-F238E27FC236}">
+                <a16:creationId xmlns:a16="http://schemas.microsoft.com/office/drawing/2014/main" id="{5B914678-A0C3-CE4C-9D28-8F74A9497E25}"/>
+              </a:ext>
+            </a:extLst>
+          </p:cNvPr>
+          <p:cNvCxnSpPr>
+            <a:cxnSpLocks/>
+          </p:cNvCxnSpPr>
+          <p:nvPr/>
+        </p:nvCxnSpPr>
+        <p:spPr>
+          <a:xfrm>
+            <a:off x="647700" y="4186869"/>
+            <a:ext cx="11074887" cy="0"/>
+          </a:xfrm>
+          <a:prstGeom prst="line">
+            <a:avLst/>
+          </a:prstGeom>
+          <a:ln w="57150">
+            <a:solidFill>
+              <a:schemeClr val="bg1">
+                <a:lumMod val="50000"/>
+              </a:schemeClr>
+            </a:solidFill>
+            <a:prstDash val="sysDot"/>
+          </a:ln>
+        </p:spPr>
+        <p:style>
+          <a:lnRef idx="1">
+            <a:schemeClr val="accent1"/>
+          </a:lnRef>
+          <a:fillRef idx="0">
+            <a:schemeClr val="accent1"/>
+          </a:fillRef>
+          <a:effectRef idx="0">
+            <a:schemeClr val="accent1"/>
+          </a:effectRef>
+          <a:fontRef idx="minor">
+            <a:schemeClr val="tx1"/>
+          </a:fontRef>
+        </p:style>
+      </p:cxnSp>
+      <p:sp>
+        <p:nvSpPr>
+          <p:cNvPr id="31" name="TextBox 30">
+            <a:extLst>
+              <a:ext uri="{FF2B5EF4-FFF2-40B4-BE49-F238E27FC236}">
+                <a16:creationId xmlns:a16="http://schemas.microsoft.com/office/drawing/2014/main" id="{80798F0B-1546-3C4C-98B6-7A63630721D5}"/>
+              </a:ext>
+            </a:extLst>
+          </p:cNvPr>
+          <p:cNvSpPr txBox="1"/>
+          <p:nvPr/>
+        </p:nvSpPr>
+        <p:spPr>
+          <a:xfrm>
+            <a:off x="7528934" y="7966887"/>
+            <a:ext cx="1548822" cy="584775"/>
+          </a:xfrm>
+          <a:prstGeom prst="rect">
+            <a:avLst/>
+          </a:prstGeom>
+          <a:noFill/>
+        </p:spPr>
+        <p:txBody>
+          <a:bodyPr wrap="none" rtlCol="0">
+            <a:spAutoFit/>
+          </a:bodyPr>
+          <a:lstStyle/>
+          <a:p>
+            <a:r>
+              <a:rPr lang="en-US" sz="3200" dirty="0"/>
+              <a:t>3.0 mm </a:t>
+            </a:r>
+          </a:p>
+        </p:txBody>
+      </p:sp>
+      <p:grpSp>
+        <p:nvGrpSpPr>
+          <p:cNvPr id="32" name="Group 31">
+            <a:extLst>
+              <a:ext uri="{FF2B5EF4-FFF2-40B4-BE49-F238E27FC236}">
+                <a16:creationId xmlns:a16="http://schemas.microsoft.com/office/drawing/2014/main" id="{A1B914D6-F6AC-DB4C-8850-2DE08E277A81}"/>
+              </a:ext>
+            </a:extLst>
+          </p:cNvPr>
+          <p:cNvGrpSpPr/>
+          <p:nvPr/>
+        </p:nvGrpSpPr>
+        <p:grpSpPr>
+          <a:xfrm>
+            <a:off x="5928217" y="8813009"/>
+            <a:ext cx="463550" cy="393700"/>
+            <a:chOff x="6013183" y="3111500"/>
+            <a:chExt cx="463550" cy="393700"/>
+          </a:xfrm>
+          <a:solidFill>
+            <a:srgbClr val="FF0000"/>
+          </a:solidFill>
+        </p:grpSpPr>
+        <p:sp>
+          <p:nvSpPr>
+            <p:cNvPr id="33" name="Oval 32">
+              <a:extLst>
+                <a:ext uri="{FF2B5EF4-FFF2-40B4-BE49-F238E27FC236}">
+                  <a16:creationId xmlns:a16="http://schemas.microsoft.com/office/drawing/2014/main" id="{CAD49CD9-79DD-6A46-ACF4-B6E8AA495C2E}"/>
+                </a:ext>
+              </a:extLst>
+            </p:cNvPr>
+            <p:cNvSpPr>
+              <a:spLocks noChangeAspect="1"/>
+            </p:cNvSpPr>
+            <p:nvPr/>
+          </p:nvSpPr>
+          <p:spPr>
+            <a:xfrm>
+              <a:off x="6178283" y="3263290"/>
+              <a:ext cx="91440" cy="91440"/>
+            </a:xfrm>
+            <a:prstGeom prst="ellipse">
+              <a:avLst/>
+            </a:prstGeom>
+            <a:grpFill/>
+            <a:ln w="25400">
+              <a:solidFill>
+                <a:srgbClr val="FF0000"/>
+              </a:solidFill>
+            </a:ln>
+          </p:spPr>
+          <p:style>
+            <a:lnRef idx="2">
+              <a:schemeClr val="accent1">
+                <a:shade val="50000"/>
+              </a:schemeClr>
+            </a:lnRef>
+            <a:fillRef idx="1">
+              <a:schemeClr val="accent1"/>
+            </a:fillRef>
+            <a:effectRef idx="0">
+              <a:schemeClr val="accent1"/>
+            </a:effectRef>
+            <a:fontRef idx="minor">
+              <a:schemeClr val="lt1"/>
+            </a:fontRef>
+          </p:style>
+          <p:txBody>
+            <a:bodyPr rtlCol="0" anchor="ctr"/>
+            <a:lstStyle/>
+            <a:p>
+              <a:pPr algn="ctr"/>
+              <a:endParaRPr lang="en-US"/>
+            </a:p>
+          </p:txBody>
+        </p:sp>
+        <p:cxnSp>
+          <p:nvCxnSpPr>
+            <p:cNvPr id="34" name="Straight Connector 33">
+              <a:extLst>
+                <a:ext uri="{FF2B5EF4-FFF2-40B4-BE49-F238E27FC236}">
+                  <a16:creationId xmlns:a16="http://schemas.microsoft.com/office/drawing/2014/main" id="{876C638E-E3E6-2741-AE52-1812699C0E25}"/>
+                </a:ext>
+              </a:extLst>
+            </p:cNvPr>
+            <p:cNvCxnSpPr>
+              <a:cxnSpLocks/>
+            </p:cNvCxnSpPr>
+            <p:nvPr/>
+          </p:nvCxnSpPr>
+          <p:spPr>
+            <a:xfrm>
+              <a:off x="6219201" y="3111500"/>
+              <a:ext cx="0" cy="393700"/>
+            </a:xfrm>
+            <a:prstGeom prst="line">
+              <a:avLst/>
+            </a:prstGeom>
+            <a:grpFill/>
+            <a:ln w="25400">
+              <a:solidFill>
+                <a:srgbClr val="FF0000"/>
+              </a:solidFill>
+            </a:ln>
+          </p:spPr>
+          <p:style>
+            <a:lnRef idx="1">
+              <a:schemeClr val="accent1"/>
+            </a:lnRef>
+            <a:fillRef idx="0">
+              <a:schemeClr val="accent1"/>
+            </a:fillRef>
+            <a:effectRef idx="0">
+              <a:schemeClr val="accent1"/>
+            </a:effectRef>
+            <a:fontRef idx="minor">
+              <a:schemeClr val="tx1"/>
+            </a:fontRef>
+          </p:style>
+        </p:cxnSp>
+        <p:cxnSp>
+          <p:nvCxnSpPr>
+            <p:cNvPr id="35" name="Straight Connector 34">
+              <a:extLst>
+                <a:ext uri="{FF2B5EF4-FFF2-40B4-BE49-F238E27FC236}">
+                  <a16:creationId xmlns:a16="http://schemas.microsoft.com/office/drawing/2014/main" id="{DFFE43DA-B4D5-2E41-9600-BBEF4FB9A0AB}"/>
+                </a:ext>
+              </a:extLst>
+            </p:cNvPr>
+            <p:cNvCxnSpPr>
+              <a:cxnSpLocks/>
+            </p:cNvCxnSpPr>
+            <p:nvPr/>
+          </p:nvCxnSpPr>
+          <p:spPr>
+            <a:xfrm>
+              <a:off x="6013183" y="3308350"/>
+              <a:ext cx="463550" cy="0"/>
+            </a:xfrm>
+            <a:prstGeom prst="line">
+              <a:avLst/>
+            </a:prstGeom>
+            <a:grpFill/>
+            <a:ln w="25400">
+              <a:solidFill>
+                <a:srgbClr val="FF0000"/>
+              </a:solidFill>
+            </a:ln>
+          </p:spPr>
+          <p:style>
+            <a:lnRef idx="1">
+              <a:schemeClr val="accent1"/>
+            </a:lnRef>
+            <a:fillRef idx="0">
+              <a:schemeClr val="accent1"/>
+            </a:fillRef>
+            <a:effectRef idx="0">
+              <a:schemeClr val="accent1"/>
+            </a:effectRef>
+            <a:fontRef idx="minor">
+              <a:schemeClr val="tx1"/>
+            </a:fontRef>
+          </p:style>
+        </p:cxnSp>
+      </p:grpSp>
+      <p:sp>
+        <p:nvSpPr>
+          <p:cNvPr id="36" name="TextBox 35">
+            <a:extLst>
+              <a:ext uri="{FF2B5EF4-FFF2-40B4-BE49-F238E27FC236}">
+                <a16:creationId xmlns:a16="http://schemas.microsoft.com/office/drawing/2014/main" id="{8F57322D-8168-9942-8FD4-CC1B0C140606}"/>
+              </a:ext>
+            </a:extLst>
+          </p:cNvPr>
+          <p:cNvSpPr txBox="1"/>
+          <p:nvPr/>
+        </p:nvSpPr>
+        <p:spPr>
+          <a:xfrm>
+            <a:off x="6432685" y="8813009"/>
+            <a:ext cx="2082665" cy="523220"/>
+          </a:xfrm>
+          <a:prstGeom prst="rect">
+            <a:avLst/>
+          </a:prstGeom>
+          <a:noFill/>
+        </p:spPr>
+        <p:txBody>
+          <a:bodyPr wrap="square" rtlCol="0">
+            <a:spAutoFit/>
+          </a:bodyPr>
+          <a:lstStyle/>
+          <a:p>
+            <a:r>
+              <a:rPr lang="en-US" sz="2800" dirty="0" err="1">
+                <a:solidFill>
+                  <a:schemeClr val="bg1"/>
+                </a:solidFill>
+              </a:rPr>
+              <a:t>ring_height</a:t>
+            </a:r>
+            <a:endParaRPr lang="en-US" sz="2800" dirty="0">
+              <a:solidFill>
+                <a:schemeClr val="bg1"/>
+              </a:solidFill>
+            </a:endParaRPr>
+          </a:p>
+        </p:txBody>
+      </p:sp>
+      <p:sp>
+        <p:nvSpPr>
+          <p:cNvPr id="37" name="TextBox 36">
+            <a:extLst>
+              <a:ext uri="{FF2B5EF4-FFF2-40B4-BE49-F238E27FC236}">
+                <a16:creationId xmlns:a16="http://schemas.microsoft.com/office/drawing/2014/main" id="{F9D9C5E5-6271-D74C-A239-446DFB903D8A}"/>
+              </a:ext>
+            </a:extLst>
+          </p:cNvPr>
+          <p:cNvSpPr txBox="1"/>
+          <p:nvPr/>
+        </p:nvSpPr>
+        <p:spPr>
+          <a:xfrm>
+            <a:off x="4001712" y="473721"/>
+            <a:ext cx="4932738" cy="923330"/>
+          </a:xfrm>
+          <a:prstGeom prst="rect">
+            <a:avLst/>
+          </a:prstGeom>
+          <a:noFill/>
+        </p:spPr>
+        <p:txBody>
+          <a:bodyPr wrap="square" rtlCol="0">
+            <a:spAutoFit/>
+          </a:bodyPr>
+          <a:lstStyle/>
+          <a:p>
+            <a:r>
+              <a:rPr lang="en-US" sz="5400" dirty="0"/>
+              <a:t>LMFE Placement</a:t>
+            </a:r>
+          </a:p>
+        </p:txBody>
+      </p:sp>
+    </p:spTree>
+    <p:extLst>
+      <p:ext uri="{BB962C8B-B14F-4D97-AF65-F5344CB8AC3E}">
+        <p14:creationId xmlns:p14="http://schemas.microsoft.com/office/powerpoint/2010/main" val="3402487764"/>
       </p:ext>
     </p:extLst>
   </p:cSld>

</xml_diff>